<commit_message>
Cleaned up Zip Folder
</commit_message>
<xml_diff>
--- a/Presentation/Small Project - Contact Manager Group 13.pptx
+++ b/Presentation/Small Project - Contact Manager Group 13.pptx
@@ -2955,10 +2955,9 @@
           <a:p>
             <a:pPr lvl="0"/>
             <a:r>
-              <a:rPr lang="en-US" altLang="en-US" noProof="0" smtClean="0"/>
+              <a:rPr lang="en-US" altLang="en-US" noProof="0"/>
               <a:t>Click to edit Master title style</a:t>
             </a:r>
-            <a:endParaRPr lang="en-US" altLang="en-US" noProof="0"/>
           </a:p>
         </p:txBody>
       </p:sp>
@@ -2990,7 +2989,7 @@
           <a:p>
             <a:pPr lvl="0"/>
             <a:r>
-              <a:rPr lang="en-US" altLang="en-US" noProof="0" smtClean="0"/>
+              <a:rPr lang="en-US" altLang="en-US" noProof="0"/>
               <a:t>Click to edit Master subtitle style</a:t>
             </a:r>
             <a:endParaRPr lang="en-US" altLang="en-US" noProof="0" dirty="0"/>
@@ -3120,10 +3119,9 @@
           <a:lstStyle/>
           <a:p>
             <a:r>
-              <a:rPr lang="en-US" smtClean="0"/>
+              <a:rPr lang="en-US"/>
               <a:t>Click to edit Master title style</a:t>
             </a:r>
-            <a:endParaRPr lang="en-US"/>
           </a:p>
         </p:txBody>
       </p:sp>
@@ -3150,35 +3148,35 @@
           <a:p>
             <a:pPr lvl="0"/>
             <a:r>
-              <a:rPr lang="en-US" smtClean="0"/>
+              <a:rPr lang="en-US"/>
               <a:t>Edit Master text styles</a:t>
             </a:r>
           </a:p>
           <a:p>
             <a:pPr lvl="1"/>
             <a:r>
-              <a:rPr lang="en-US" smtClean="0"/>
+              <a:rPr lang="en-US"/>
               <a:t>Second level</a:t>
             </a:r>
           </a:p>
           <a:p>
             <a:pPr lvl="2"/>
             <a:r>
-              <a:rPr lang="en-US" smtClean="0"/>
+              <a:rPr lang="en-US"/>
               <a:t>Third level</a:t>
             </a:r>
           </a:p>
           <a:p>
             <a:pPr lvl="3"/>
             <a:r>
-              <a:rPr lang="en-US" smtClean="0"/>
+              <a:rPr lang="en-US"/>
               <a:t>Fourth level</a:t>
             </a:r>
           </a:p>
           <a:p>
             <a:pPr lvl="4"/>
             <a:r>
-              <a:rPr lang="en-US" smtClean="0"/>
+              <a:rPr lang="en-US"/>
               <a:t>Fifth level</a:t>
             </a:r>
             <a:endParaRPr lang="en-US" dirty="0"/>
@@ -3318,10 +3316,9 @@
           <a:lstStyle/>
           <a:p>
             <a:r>
-              <a:rPr lang="en-US" smtClean="0"/>
+              <a:rPr lang="en-US"/>
               <a:t>Click to edit Master title style</a:t>
             </a:r>
-            <a:endParaRPr lang="en-US"/>
           </a:p>
         </p:txBody>
       </p:sp>
@@ -3353,35 +3350,35 @@
           <a:p>
             <a:pPr lvl="0"/>
             <a:r>
-              <a:rPr lang="en-US" smtClean="0"/>
+              <a:rPr lang="en-US"/>
               <a:t>Edit Master text styles</a:t>
             </a:r>
           </a:p>
           <a:p>
             <a:pPr lvl="1"/>
             <a:r>
-              <a:rPr lang="en-US" smtClean="0"/>
+              <a:rPr lang="en-US"/>
               <a:t>Second level</a:t>
             </a:r>
           </a:p>
           <a:p>
             <a:pPr lvl="2"/>
             <a:r>
-              <a:rPr lang="en-US" smtClean="0"/>
+              <a:rPr lang="en-US"/>
               <a:t>Third level</a:t>
             </a:r>
           </a:p>
           <a:p>
             <a:pPr lvl="3"/>
             <a:r>
-              <a:rPr lang="en-US" smtClean="0"/>
+              <a:rPr lang="en-US"/>
               <a:t>Fourth level</a:t>
             </a:r>
           </a:p>
           <a:p>
             <a:pPr lvl="4"/>
             <a:r>
-              <a:rPr lang="en-US" smtClean="0"/>
+              <a:rPr lang="en-US"/>
               <a:t>Fifth level</a:t>
             </a:r>
             <a:endParaRPr lang="en-US" dirty="0"/>
@@ -3516,10 +3513,9 @@
           <a:lstStyle/>
           <a:p>
             <a:r>
-              <a:rPr lang="en-US" smtClean="0"/>
+              <a:rPr lang="en-US"/>
               <a:t>Click to edit Master title style</a:t>
             </a:r>
-            <a:endParaRPr lang="en-US"/>
           </a:p>
         </p:txBody>
       </p:sp>
@@ -3546,35 +3542,35 @@
           <a:p>
             <a:pPr lvl="0"/>
             <a:r>
-              <a:rPr lang="en-US" smtClean="0"/>
+              <a:rPr lang="en-US"/>
               <a:t>Edit Master text styles</a:t>
             </a:r>
           </a:p>
           <a:p>
             <a:pPr lvl="1"/>
             <a:r>
-              <a:rPr lang="en-US" smtClean="0"/>
+              <a:rPr lang="en-US"/>
               <a:t>Second level</a:t>
             </a:r>
           </a:p>
           <a:p>
             <a:pPr lvl="2"/>
             <a:r>
-              <a:rPr lang="en-US" smtClean="0"/>
+              <a:rPr lang="en-US"/>
               <a:t>Third level</a:t>
             </a:r>
           </a:p>
           <a:p>
             <a:pPr lvl="3"/>
             <a:r>
-              <a:rPr lang="en-US" smtClean="0"/>
+              <a:rPr lang="en-US"/>
               <a:t>Fourth level</a:t>
             </a:r>
           </a:p>
           <a:p>
             <a:pPr lvl="4"/>
             <a:r>
-              <a:rPr lang="en-US" smtClean="0"/>
+              <a:rPr lang="en-US"/>
               <a:t>Fifth level</a:t>
             </a:r>
             <a:endParaRPr lang="en-US" dirty="0"/>
@@ -3718,10 +3714,9 @@
           </a:lstStyle>
           <a:p>
             <a:r>
-              <a:rPr lang="en-US" smtClean="0"/>
+              <a:rPr lang="en-US"/>
               <a:t>Click to edit Master title style</a:t>
             </a:r>
-            <a:endParaRPr lang="en-US"/>
           </a:p>
         </p:txBody>
       </p:sp>
@@ -3784,7 +3779,7 @@
           <a:p>
             <a:pPr lvl="0"/>
             <a:r>
-              <a:rPr lang="en-US" smtClean="0"/>
+              <a:rPr lang="en-US"/>
               <a:t>Edit Master text styles</a:t>
             </a:r>
           </a:p>
@@ -3918,10 +3913,9 @@
           <a:lstStyle/>
           <a:p>
             <a:r>
-              <a:rPr lang="en-US" smtClean="0"/>
+              <a:rPr lang="en-US"/>
               <a:t>Click to edit Master title style</a:t>
             </a:r>
-            <a:endParaRPr lang="en-US"/>
           </a:p>
         </p:txBody>
       </p:sp>
@@ -3977,35 +3971,35 @@
           <a:p>
             <a:pPr lvl="0"/>
             <a:r>
-              <a:rPr lang="en-US" smtClean="0"/>
+              <a:rPr lang="en-US"/>
               <a:t>Edit Master text styles</a:t>
             </a:r>
           </a:p>
           <a:p>
             <a:pPr lvl="1"/>
             <a:r>
-              <a:rPr lang="en-US" smtClean="0"/>
+              <a:rPr lang="en-US"/>
               <a:t>Second level</a:t>
             </a:r>
           </a:p>
           <a:p>
             <a:pPr lvl="2"/>
             <a:r>
-              <a:rPr lang="en-US" smtClean="0"/>
+              <a:rPr lang="en-US"/>
               <a:t>Third level</a:t>
             </a:r>
           </a:p>
           <a:p>
             <a:pPr lvl="3"/>
             <a:r>
-              <a:rPr lang="en-US" smtClean="0"/>
+              <a:rPr lang="en-US"/>
               <a:t>Fourth level</a:t>
             </a:r>
           </a:p>
           <a:p>
             <a:pPr lvl="4"/>
             <a:r>
-              <a:rPr lang="en-US" smtClean="0"/>
+              <a:rPr lang="en-US"/>
               <a:t>Fifth level</a:t>
             </a:r>
             <a:endParaRPr lang="en-US" dirty="0"/>
@@ -4064,35 +4058,35 @@
           <a:p>
             <a:pPr lvl="0"/>
             <a:r>
-              <a:rPr lang="en-US" smtClean="0"/>
+              <a:rPr lang="en-US"/>
               <a:t>Edit Master text styles</a:t>
             </a:r>
           </a:p>
           <a:p>
             <a:pPr lvl="1"/>
             <a:r>
-              <a:rPr lang="en-US" smtClean="0"/>
+              <a:rPr lang="en-US"/>
               <a:t>Second level</a:t>
             </a:r>
           </a:p>
           <a:p>
             <a:pPr lvl="2"/>
             <a:r>
-              <a:rPr lang="en-US" smtClean="0"/>
+              <a:rPr lang="en-US"/>
               <a:t>Third level</a:t>
             </a:r>
           </a:p>
           <a:p>
             <a:pPr lvl="3"/>
             <a:r>
-              <a:rPr lang="en-US" smtClean="0"/>
+              <a:rPr lang="en-US"/>
               <a:t>Fourth level</a:t>
             </a:r>
           </a:p>
           <a:p>
             <a:pPr lvl="4"/>
             <a:r>
-              <a:rPr lang="en-US" smtClean="0"/>
+              <a:rPr lang="en-US"/>
               <a:t>Fifth level</a:t>
             </a:r>
             <a:endParaRPr lang="en-US" dirty="0"/>
@@ -4236,10 +4230,9 @@
           </a:lstStyle>
           <a:p>
             <a:r>
-              <a:rPr lang="en-US" smtClean="0"/>
+              <a:rPr lang="en-US"/>
               <a:t>Click to edit Master title style</a:t>
             </a:r>
-            <a:endParaRPr lang="en-US"/>
           </a:p>
         </p:txBody>
       </p:sp>
@@ -4302,7 +4295,7 @@
           <a:p>
             <a:pPr lvl="0"/>
             <a:r>
-              <a:rPr lang="en-US" smtClean="0"/>
+              <a:rPr lang="en-US"/>
               <a:t>Edit Master text styles</a:t>
             </a:r>
           </a:p>
@@ -4360,35 +4353,35 @@
           <a:p>
             <a:pPr lvl="0"/>
             <a:r>
-              <a:rPr lang="en-US" smtClean="0"/>
+              <a:rPr lang="en-US"/>
               <a:t>Edit Master text styles</a:t>
             </a:r>
           </a:p>
           <a:p>
             <a:pPr lvl="1"/>
             <a:r>
-              <a:rPr lang="en-US" smtClean="0"/>
+              <a:rPr lang="en-US"/>
               <a:t>Second level</a:t>
             </a:r>
           </a:p>
           <a:p>
             <a:pPr lvl="2"/>
             <a:r>
-              <a:rPr lang="en-US" smtClean="0"/>
+              <a:rPr lang="en-US"/>
               <a:t>Third level</a:t>
             </a:r>
           </a:p>
           <a:p>
             <a:pPr lvl="3"/>
             <a:r>
-              <a:rPr lang="en-US" smtClean="0"/>
+              <a:rPr lang="en-US"/>
               <a:t>Fourth level</a:t>
             </a:r>
           </a:p>
           <a:p>
             <a:pPr lvl="4"/>
             <a:r>
-              <a:rPr lang="en-US" smtClean="0"/>
+              <a:rPr lang="en-US"/>
               <a:t>Fifth level</a:t>
             </a:r>
             <a:endParaRPr lang="en-US" dirty="0"/>
@@ -4454,7 +4447,7 @@
           <a:p>
             <a:pPr lvl="0"/>
             <a:r>
-              <a:rPr lang="en-US" smtClean="0"/>
+              <a:rPr lang="en-US"/>
               <a:t>Edit Master text styles</a:t>
             </a:r>
           </a:p>
@@ -4512,35 +4505,35 @@
           <a:p>
             <a:pPr lvl="0"/>
             <a:r>
-              <a:rPr lang="en-US" smtClean="0"/>
+              <a:rPr lang="en-US"/>
               <a:t>Edit Master text styles</a:t>
             </a:r>
           </a:p>
           <a:p>
             <a:pPr lvl="1"/>
             <a:r>
-              <a:rPr lang="en-US" smtClean="0"/>
+              <a:rPr lang="en-US"/>
               <a:t>Second level</a:t>
             </a:r>
           </a:p>
           <a:p>
             <a:pPr lvl="2"/>
             <a:r>
-              <a:rPr lang="en-US" smtClean="0"/>
+              <a:rPr lang="en-US"/>
               <a:t>Third level</a:t>
             </a:r>
           </a:p>
           <a:p>
             <a:pPr lvl="3"/>
             <a:r>
-              <a:rPr lang="en-US" smtClean="0"/>
+              <a:rPr lang="en-US"/>
               <a:t>Fourth level</a:t>
             </a:r>
           </a:p>
           <a:p>
             <a:pPr lvl="4"/>
             <a:r>
-              <a:rPr lang="en-US" smtClean="0"/>
+              <a:rPr lang="en-US"/>
               <a:t>Fifth level</a:t>
             </a:r>
             <a:endParaRPr lang="en-US" dirty="0"/>
@@ -4675,10 +4668,9 @@
           <a:lstStyle/>
           <a:p>
             <a:r>
-              <a:rPr lang="en-US" smtClean="0"/>
+              <a:rPr lang="en-US"/>
               <a:t>Click to edit Master title style</a:t>
             </a:r>
-            <a:endParaRPr lang="en-US"/>
           </a:p>
         </p:txBody>
       </p:sp>
@@ -4931,10 +4923,9 @@
           </a:lstStyle>
           <a:p>
             <a:r>
-              <a:rPr lang="en-US" smtClean="0"/>
+              <a:rPr lang="en-US"/>
               <a:t>Click to edit Master title style</a:t>
             </a:r>
-            <a:endParaRPr lang="en-US"/>
           </a:p>
         </p:txBody>
       </p:sp>
@@ -4990,35 +4981,35 @@
           <a:p>
             <a:pPr lvl="0"/>
             <a:r>
-              <a:rPr lang="en-US" smtClean="0"/>
+              <a:rPr lang="en-US"/>
               <a:t>Edit Master text styles</a:t>
             </a:r>
           </a:p>
           <a:p>
             <a:pPr lvl="1"/>
             <a:r>
-              <a:rPr lang="en-US" smtClean="0"/>
+              <a:rPr lang="en-US"/>
               <a:t>Second level</a:t>
             </a:r>
           </a:p>
           <a:p>
             <a:pPr lvl="2"/>
             <a:r>
-              <a:rPr lang="en-US" smtClean="0"/>
+              <a:rPr lang="en-US"/>
               <a:t>Third level</a:t>
             </a:r>
           </a:p>
           <a:p>
             <a:pPr lvl="3"/>
             <a:r>
-              <a:rPr lang="en-US" smtClean="0"/>
+              <a:rPr lang="en-US"/>
               <a:t>Fourth level</a:t>
             </a:r>
           </a:p>
           <a:p>
             <a:pPr lvl="4"/>
             <a:r>
-              <a:rPr lang="en-US" smtClean="0"/>
+              <a:rPr lang="en-US"/>
               <a:t>Fifth level</a:t>
             </a:r>
             <a:endParaRPr lang="en-US" dirty="0"/>
@@ -5084,7 +5075,7 @@
           <a:p>
             <a:pPr lvl="0"/>
             <a:r>
-              <a:rPr lang="en-US" smtClean="0"/>
+              <a:rPr lang="en-US"/>
               <a:t>Edit Master text styles</a:t>
             </a:r>
           </a:p>
@@ -5227,10 +5218,9 @@
           </a:lstStyle>
           <a:p>
             <a:r>
-              <a:rPr lang="en-US" smtClean="0"/>
+              <a:rPr lang="en-US"/>
               <a:t>Click to edit Master title style</a:t>
             </a:r>
-            <a:endParaRPr lang="en-US"/>
           </a:p>
         </p:txBody>
       </p:sp>
@@ -5292,7 +5282,7 @@
           </a:lstStyle>
           <a:p>
             <a:r>
-              <a:rPr lang="en-US" smtClean="0"/>
+              <a:rPr lang="en-US"/>
               <a:t>Click icon to add picture</a:t>
             </a:r>
             <a:endParaRPr lang="en-US" dirty="0"/>
@@ -5358,7 +5348,7 @@
           <a:p>
             <a:pPr lvl="0"/>
             <a:r>
-              <a:rPr lang="en-US" smtClean="0"/>
+              <a:rPr lang="en-US"/>
               <a:t>Edit Master text styles</a:t>
             </a:r>
           </a:p>
@@ -7257,10 +7247,9 @@
           <a:p>
             <a:pPr lvl="0"/>
             <a:r>
-              <a:rPr lang="en-US" altLang="en-US" smtClean="0"/>
+              <a:rPr lang="en-US" altLang="en-US"/>
               <a:t>Click to edit Master title style</a:t>
             </a:r>
-            <a:endParaRPr lang="en-US" altLang="en-US"/>
           </a:p>
         </p:txBody>
       </p:sp>
@@ -7327,35 +7316,35 @@
           <a:p>
             <a:pPr lvl="0"/>
             <a:r>
-              <a:rPr lang="en-US" altLang="en-US" smtClean="0"/>
+              <a:rPr lang="en-US" altLang="en-US"/>
               <a:t>Edit Master text styles</a:t>
             </a:r>
           </a:p>
           <a:p>
             <a:pPr lvl="1"/>
             <a:r>
-              <a:rPr lang="en-US" altLang="en-US" smtClean="0"/>
+              <a:rPr lang="en-US" altLang="en-US"/>
               <a:t>Second level</a:t>
             </a:r>
           </a:p>
           <a:p>
             <a:pPr lvl="2"/>
             <a:r>
-              <a:rPr lang="en-US" altLang="en-US" smtClean="0"/>
+              <a:rPr lang="en-US" altLang="en-US"/>
               <a:t>Third level</a:t>
             </a:r>
           </a:p>
           <a:p>
             <a:pPr lvl="3"/>
             <a:r>
-              <a:rPr lang="en-US" altLang="en-US" smtClean="0"/>
+              <a:rPr lang="en-US" altLang="en-US"/>
               <a:t>Fourth level</a:t>
             </a:r>
           </a:p>
           <a:p>
             <a:pPr lvl="4"/>
             <a:r>
-              <a:rPr lang="en-US" altLang="en-US" smtClean="0"/>
+              <a:rPr lang="en-US" altLang="en-US"/>
               <a:t>Fifth level</a:t>
             </a:r>
             <a:endParaRPr lang="en-US" altLang="en-US" dirty="0"/>
@@ -8085,10 +8074,9 @@
           <a:lstStyle/>
           <a:p>
             <a:r>
-              <a:rPr lang="en-US" dirty="0" smtClean="0"/>
+              <a:rPr lang="en-US" dirty="0"/>
               <a:t>Contact Manager</a:t>
             </a:r>
-            <a:endParaRPr lang="en-US" dirty="0"/>
           </a:p>
         </p:txBody>
       </p:sp>
@@ -8114,10 +8102,9 @@
           <a:lstStyle/>
           <a:p>
             <a:r>
-              <a:rPr lang="en-US" dirty="0" smtClean="0"/>
-              <a:t>COP 4331C - Object Oriented Software Development</a:t>
-            </a:r>
-            <a:endParaRPr lang="en-US" dirty="0"/>
+              <a:rPr lang="en-US" dirty="0"/>
+              <a:t>A new way to contact</a:t>
+            </a:r>
           </a:p>
         </p:txBody>
       </p:sp>
@@ -8173,10 +8160,9 @@
           <a:p>
             <a:pPr algn="ctr"/>
             <a:r>
-              <a:rPr lang="en-US" sz="6600" dirty="0" smtClean="0"/>
+              <a:rPr lang="en-US" sz="6600" dirty="0"/>
               <a:t>LIVE DEMO</a:t>
             </a:r>
-            <a:endParaRPr lang="en-US" sz="6600" dirty="0"/>
           </a:p>
         </p:txBody>
       </p:sp>
@@ -8226,10 +8212,9 @@
           <a:lstStyle/>
           <a:p>
             <a:r>
-              <a:rPr lang="en-US" sz="4400" dirty="0" smtClean="0"/>
+              <a:rPr lang="en-US" sz="4400" dirty="0"/>
               <a:t>Questions?</a:t>
             </a:r>
-            <a:endParaRPr lang="en-US" sz="4400" dirty="0"/>
           </a:p>
         </p:txBody>
       </p:sp>
@@ -8253,7 +8238,7 @@
               <a:buChar char="•"/>
             </a:pPr>
             <a:r>
-              <a:rPr lang="en-US" dirty="0" smtClean="0"/>
+              <a:rPr lang="en-US" dirty="0"/>
               <a:t>Website </a:t>
             </a:r>
           </a:p>
@@ -8263,31 +8248,19 @@
               <a:buChar char="•"/>
             </a:pPr>
             <a:r>
-              <a:rPr lang="en-US" dirty="0" smtClean="0">
-                <a:hlinkClick r:id="rId2"/>
-              </a:rPr>
-              <a:t>http</a:t>
-            </a:r>
-            <a:r>
               <a:rPr lang="en-US" dirty="0">
                 <a:hlinkClick r:id="rId2"/>
               </a:rPr>
-              <a:t>://m4rks.site</a:t>
-            </a:r>
-            <a:r>
-              <a:rPr lang="en-US" dirty="0" smtClean="0">
-                <a:hlinkClick r:id="rId2"/>
-              </a:rPr>
-              <a:t>/</a:t>
-            </a:r>
-            <a:endParaRPr lang="en-US" dirty="0" smtClean="0"/>
+              <a:t>http://m4rks.site/</a:t>
+            </a:r>
+            <a:endParaRPr lang="en-US" dirty="0"/>
           </a:p>
           <a:p>
             <a:pPr marL="502920" indent="-457200">
               <a:buFont typeface="Arial" panose="020B0604020202020204" pitchFamily="34" charset="0"/>
               <a:buChar char="•"/>
             </a:pPr>
-            <a:endParaRPr lang="en-US" dirty="0" smtClean="0"/>
+            <a:endParaRPr lang="en-US" dirty="0"/>
           </a:p>
           <a:p>
             <a:pPr marL="502920" indent="-457200">
@@ -8295,11 +8268,11 @@
               <a:buChar char="•"/>
             </a:pPr>
             <a:r>
-              <a:rPr lang="en-US" dirty="0" err="1" smtClean="0"/>
+              <a:rPr lang="en-US" dirty="0" err="1"/>
               <a:t>Github</a:t>
             </a:r>
             <a:r>
-              <a:rPr lang="en-US" dirty="0" smtClean="0"/>
+              <a:rPr lang="en-US" dirty="0"/>
               <a:t> Repository</a:t>
             </a:r>
           </a:p>
@@ -8312,15 +8285,9 @@
               <a:rPr lang="en-US" dirty="0">
                 <a:hlinkClick r:id="rId3"/>
               </a:rPr>
-              <a:t>https://</a:t>
-            </a:r>
-            <a:r>
-              <a:rPr lang="en-US" dirty="0" smtClean="0">
-                <a:hlinkClick r:id="rId3"/>
-              </a:rPr>
-              <a:t>github.com/SudoKudo/P.O.O.P-Small-Project</a:t>
-            </a:r>
-            <a:endParaRPr lang="en-US" dirty="0" smtClean="0"/>
+              <a:t>https://github.com/SudoKudo/P.O.O.P-Small-Project</a:t>
+            </a:r>
+            <a:endParaRPr lang="en-US" dirty="0"/>
           </a:p>
           <a:p>
             <a:pPr marL="1149350" lvl="1" indent="-457200">
@@ -8383,10 +8350,9 @@
           <a:lstStyle/>
           <a:p>
             <a:r>
-              <a:rPr lang="en-US" dirty="0" smtClean="0"/>
+              <a:rPr lang="en-US" dirty="0"/>
               <a:t>Team Members</a:t>
             </a:r>
-            <a:endParaRPr lang="en-US" dirty="0"/>
           </a:p>
         </p:txBody>
       </p:sp>
@@ -8413,38 +8379,28 @@
           </a:bodyPr>
           <a:lstStyle/>
           <a:p>
-            <a:endParaRPr lang="en-US" sz="1800" b="1" dirty="0" smtClean="0"/>
-          </a:p>
-          <a:p>
-            <a:pPr algn="ctr"/>
-            <a:endParaRPr lang="en-US" sz="2000" b="1" dirty="0" smtClean="0"/>
-          </a:p>
-          <a:p>
-            <a:pPr algn="ctr"/>
-            <a:r>
-              <a:rPr lang="en-US" sz="2000" b="1" dirty="0" smtClean="0"/>
-              <a:t>Project Manager</a:t>
-            </a:r>
-            <a:r>
-              <a:rPr lang="en-US" sz="2000" dirty="0" smtClean="0"/>
+            <a:endParaRPr lang="en-US" sz="2000" b="1" dirty="0"/>
+          </a:p>
+          <a:p>
+            <a:r>
+              <a:rPr lang="en-US" sz="2000" b="1" dirty="0"/>
+              <a:t>		        Project Manager</a:t>
+            </a:r>
+            <a:r>
+              <a:rPr lang="en-US" sz="2000" dirty="0"/>
               <a:t> </a:t>
             </a:r>
           </a:p>
           <a:p>
-            <a:pPr algn="ctr"/>
-            <a:r>
-              <a:rPr lang="en-US" sz="2000" dirty="0" err="1" smtClean="0"/>
-              <a:t>Pallavi</a:t>
-            </a:r>
-            <a:r>
-              <a:rPr lang="en-US" sz="2000" dirty="0" smtClean="0"/>
-              <a:t> </a:t>
-            </a:r>
-            <a:r>
-              <a:rPr lang="en-US" sz="2000" dirty="0" err="1" smtClean="0"/>
+            <a:r>
+              <a:rPr lang="en-US" sz="2000" dirty="0"/>
+              <a:t>		           Pallavi </a:t>
+            </a:r>
+            <a:r>
+              <a:rPr lang="en-US" sz="2000" dirty="0" err="1"/>
               <a:t>Dacre</a:t>
             </a:r>
-            <a:endParaRPr lang="en-US" sz="2000" dirty="0" smtClean="0"/>
+            <a:endParaRPr lang="en-US" sz="2000" dirty="0"/>
           </a:p>
         </p:txBody>
       </p:sp>
@@ -8457,14 +8413,14 @@
           <p:nvPr>
             <p:extLst>
               <p:ext uri="{D42A27DB-BD31-4B8C-83A1-F6EECF244321}">
-                <p14:modId xmlns:p14="http://schemas.microsoft.com/office/powerpoint/2010/main" val="2725905885"/>
+                <p14:modId xmlns:p14="http://schemas.microsoft.com/office/powerpoint/2010/main" val="880272592"/>
               </p:ext>
             </p:extLst>
           </p:nvPr>
         </p:nvGraphicFramePr>
         <p:xfrm>
-          <a:off x="1143000" y="3352800"/>
-          <a:ext cx="7391400" cy="1706880"/>
+          <a:off x="762000" y="3352800"/>
+          <a:ext cx="7391400" cy="1402080"/>
         </p:xfrm>
         <a:graphic>
           <a:graphicData uri="http://schemas.openxmlformats.org/drawingml/2006/table">
@@ -8480,14 +8436,14 @@
                     </a:ext>
                   </a:extLst>
                 </a:gridCol>
-                <a:gridCol w="2463800">
+                <a:gridCol w="2717800">
                   <a:extLst>
                     <a:ext uri="{9D8B030D-6E8A-4147-A177-3AD203B41FA5}">
                       <a16:colId xmlns:a16="http://schemas.microsoft.com/office/drawing/2014/main" val="642203412"/>
                     </a:ext>
                   </a:extLst>
                 </a:gridCol>
-                <a:gridCol w="2463800">
+                <a:gridCol w="2209800">
                   <a:extLst>
                     <a:ext uri="{9D8B030D-6E8A-4147-A177-3AD203B41FA5}">
                       <a16:colId xmlns:a16="http://schemas.microsoft.com/office/drawing/2014/main" val="342620938"/>
@@ -8503,10 +8459,9 @@
                     <a:p>
                       <a:pPr algn="ctr"/>
                       <a:r>
-                        <a:rPr lang="en-US" sz="2000" dirty="0" smtClean="0"/>
+                        <a:rPr lang="en-US" sz="2000" dirty="0"/>
                         <a:t>Frontend</a:t>
                       </a:r>
-                      <a:endParaRPr lang="en-US" sz="2000" dirty="0"/>
                     </a:p>
                   </a:txBody>
                   <a:tcPr/>
@@ -8518,10 +8473,9 @@
                     <a:p>
                       <a:pPr algn="ctr"/>
                       <a:r>
-                        <a:rPr lang="en-US" sz="2000" dirty="0" smtClean="0"/>
+                        <a:rPr lang="en-US" sz="2000" dirty="0"/>
                         <a:t>API</a:t>
                       </a:r>
-                      <a:endParaRPr lang="en-US" sz="2000" dirty="0"/>
                     </a:p>
                   </a:txBody>
                   <a:tcPr/>
@@ -8533,10 +8487,9 @@
                     <a:p>
                       <a:pPr algn="ctr"/>
                       <a:r>
-                        <a:rPr lang="en-US" sz="2000" dirty="0" smtClean="0"/>
+                        <a:rPr lang="en-US" sz="2000" dirty="0"/>
                         <a:t>Database</a:t>
                       </a:r>
-                      <a:endParaRPr lang="en-US" sz="2000" dirty="0"/>
                     </a:p>
                   </a:txBody>
                   <a:tcPr/>
@@ -8555,26 +8508,26 @@
                     <a:p>
                       <a:pPr algn="ctr"/>
                       <a:r>
-                        <a:rPr lang="en-US" sz="2000" dirty="0" smtClean="0"/>
+                        <a:rPr lang="en-US" sz="2000" dirty="0"/>
                         <a:t>Steffen J. </a:t>
                       </a:r>
                       <a:r>
-                        <a:rPr lang="en-US" sz="2000" dirty="0" err="1" smtClean="0"/>
+                        <a:rPr lang="en-US" sz="2000" dirty="0" err="1"/>
                         <a:t>Camarato</a:t>
                       </a:r>
-                      <a:endParaRPr lang="en-US" sz="2000" dirty="0" smtClean="0"/>
+                      <a:endParaRPr lang="en-US" sz="2000" dirty="0"/>
                     </a:p>
                     <a:p>
                       <a:pPr algn="ctr"/>
                       <a:r>
-                        <a:rPr lang="en-US" sz="2000" dirty="0" smtClean="0"/>
+                        <a:rPr lang="en-US" sz="2000" dirty="0"/>
                         <a:t>Dennis </a:t>
                       </a:r>
                       <a:r>
-                        <a:rPr lang="en-US" sz="2000" dirty="0" err="1" smtClean="0"/>
+                        <a:rPr lang="en-US" sz="2000" dirty="0" err="1"/>
                         <a:t>Gebken</a:t>
                       </a:r>
-                      <a:endParaRPr lang="en-US" sz="2000" dirty="0" smtClean="0"/>
+                      <a:endParaRPr lang="en-US" sz="2000" dirty="0"/>
                     </a:p>
                     <a:p>
                       <a:pPr algn="ctr"/>
@@ -8590,19 +8543,19 @@
                     <a:p>
                       <a:pPr algn="ctr"/>
                       <a:r>
-                        <a:rPr lang="en-US" sz="2000" dirty="0" smtClean="0"/>
+                        <a:rPr lang="en-US" sz="2000" dirty="0"/>
                         <a:t>Matthew </a:t>
                       </a:r>
                       <a:r>
-                        <a:rPr lang="en-US" sz="2000" dirty="0" err="1" smtClean="0"/>
+                        <a:rPr lang="en-US" sz="2000" dirty="0" err="1"/>
                         <a:t>Bonsignore</a:t>
                       </a:r>
-                      <a:endParaRPr lang="en-US" sz="2000" dirty="0" smtClean="0"/>
+                      <a:endParaRPr lang="en-US" sz="2000" dirty="0"/>
                     </a:p>
                     <a:p>
                       <a:pPr algn="ctr"/>
                       <a:r>
-                        <a:rPr lang="en-US" sz="2000" dirty="0" smtClean="0"/>
+                        <a:rPr lang="en-US" sz="2000" dirty="0"/>
                         <a:t>Adam Henderson</a:t>
                       </a:r>
                     </a:p>
@@ -8620,14 +8573,14 @@
                     <a:p>
                       <a:pPr algn="ctr"/>
                       <a:r>
-                        <a:rPr lang="en-US" sz="2000" dirty="0" smtClean="0"/>
+                        <a:rPr lang="en-US" sz="2000" dirty="0"/>
                         <a:t>Mark Nguyen</a:t>
                       </a:r>
                     </a:p>
                     <a:p>
                       <a:pPr algn="ctr"/>
                       <a:r>
-                        <a:rPr lang="en-US" sz="2000" dirty="0" smtClean="0"/>
+                        <a:rPr lang="en-US" sz="2000" dirty="0"/>
                         <a:t>Alexander Hunt</a:t>
                       </a:r>
                     </a:p>
@@ -8700,10 +8653,9 @@
           <a:lstStyle/>
           <a:p>
             <a:r>
-              <a:rPr lang="en-US" dirty="0" smtClean="0"/>
+              <a:rPr lang="en-US" dirty="0"/>
               <a:t>Functionalities</a:t>
             </a:r>
-            <a:endParaRPr lang="en-US" dirty="0"/>
           </a:p>
         </p:txBody>
       </p:sp>
@@ -8738,7 +8690,7 @@
               <a:buChar char="•"/>
             </a:pPr>
             <a:r>
-              <a:rPr lang="en-US" dirty="0" smtClean="0"/>
+              <a:rPr lang="en-US" dirty="0"/>
               <a:t>Provide users a secure login into a remote database</a:t>
             </a:r>
           </a:p>
@@ -8748,10 +8700,9 @@
               <a:buChar char="•"/>
             </a:pPr>
             <a:r>
-              <a:rPr lang="en-US" dirty="0" smtClean="0"/>
+              <a:rPr lang="en-US" dirty="0"/>
               <a:t>Helping users manage their contacts with a simplistic user interface</a:t>
             </a:r>
-            <a:endParaRPr lang="en-US" dirty="0"/>
           </a:p>
         </p:txBody>
       </p:sp>
@@ -8867,10 +8818,9 @@
           <a:lstStyle/>
           <a:p>
             <a:r>
-              <a:rPr lang="en-US" dirty="0" smtClean="0"/>
+              <a:rPr lang="en-US" dirty="0"/>
               <a:t>Use Case Diagram</a:t>
             </a:r>
-            <a:endParaRPr lang="en-US" dirty="0"/>
           </a:p>
         </p:txBody>
       </p:sp>
@@ -8898,7 +8848,7 @@
         </p:spPr>
         <p:txBody>
           <a:bodyPr>
-            <a:normAutofit fontScale="92500" lnSpcReduction="10000"/>
+            <a:normAutofit/>
           </a:bodyPr>
           <a:lstStyle/>
           <a:p>
@@ -8966,9 +8916,8 @@
             <a:pPr lvl="2"/>
             <a:r>
               <a:rPr lang="en-US" sz="1800" dirty="0"/>
-              <a:t>Extended Use Cases: Display Login Error, Delete Contact, View Contact; Delete and View are extended from Search, because the user must search for the contact before they can view or delete it</a:t>
-            </a:r>
-            <a:endParaRPr lang="en-US" sz="1800" dirty="0"/>
+              <a:t>Extended Use Cases: Display Login Error, Delete Contact, View Contact; Delete and View</a:t>
+            </a:r>
           </a:p>
         </p:txBody>
       </p:sp>
@@ -8994,7 +8943,7 @@
         </p:blipFill>
         <p:spPr>
           <a:xfrm>
-            <a:off x="5029200" y="1776845"/>
+            <a:off x="4953000" y="1776845"/>
             <a:ext cx="4038600" cy="4058372"/>
           </a:xfrm>
           <a:prstGeom prst="rect">
@@ -9054,10 +9003,9 @@
           <a:lstStyle/>
           <a:p>
             <a:r>
-              <a:rPr lang="en-US" dirty="0" smtClean="0"/>
+              <a:rPr lang="en-US" dirty="0"/>
               <a:t>Class Diagram</a:t>
             </a:r>
-            <a:endParaRPr lang="en-US" dirty="0"/>
           </a:p>
         </p:txBody>
       </p:sp>
@@ -9087,24 +9035,21 @@
               <a:buChar char="•"/>
             </a:pPr>
             <a:r>
-              <a:rPr lang="en-US" dirty="0" smtClean="0"/>
-              <a:t>Displays user </a:t>
-            </a:r>
-            <a:r>
-              <a:rPr lang="en-US" dirty="0" smtClean="0"/>
-              <a:t>and contact </a:t>
-            </a:r>
-            <a:r>
-              <a:rPr lang="en-US" dirty="0" smtClean="0"/>
-              <a:t>objects in our project</a:t>
-            </a:r>
-            <a:endParaRPr lang="en-US" dirty="0"/>
+              <a:rPr lang="en-US" dirty="0"/>
+              <a:t>Displays user and contact objects</a:t>
+            </a:r>
           </a:p>
         </p:txBody>
       </p:sp>
       <p:pic>
         <p:nvPicPr>
-          <p:cNvPr id="4" name="Picture 3"/>
+          <p:cNvPr id="6" name="Picture 5">
+            <a:extLst>
+              <a:ext uri="{FF2B5EF4-FFF2-40B4-BE49-F238E27FC236}">
+                <a16:creationId xmlns:a16="http://schemas.microsoft.com/office/drawing/2014/main" id="{6EEF2D30-E4A7-473B-920D-49BD172A12BF}"/>
+              </a:ext>
+            </a:extLst>
+          </p:cNvPr>
           <p:cNvPicPr>
             <a:picLocks noChangeAspect="1"/>
           </p:cNvPicPr>
@@ -9124,8 +9069,8 @@
         </p:blipFill>
         <p:spPr>
           <a:xfrm>
-            <a:off x="762000" y="2667000"/>
-            <a:ext cx="7388992" cy="3816427"/>
+            <a:off x="838200" y="2514600"/>
+            <a:ext cx="7543800" cy="3909011"/>
           </a:xfrm>
           <a:prstGeom prst="rect">
             <a:avLst/>
@@ -9184,10 +9129,9 @@
           <a:lstStyle/>
           <a:p>
             <a:r>
-              <a:rPr lang="en-US" dirty="0" smtClean="0"/>
+              <a:rPr lang="en-US" dirty="0"/>
               <a:t>Entity Relationship Diagram</a:t>
             </a:r>
-            <a:endParaRPr lang="en-US" dirty="0"/>
           </a:p>
         </p:txBody>
       </p:sp>
@@ -9217,7 +9161,7 @@
               <a:buChar char="•"/>
             </a:pPr>
             <a:r>
-              <a:rPr lang="en-US" dirty="0" smtClean="0"/>
+              <a:rPr lang="en-US" dirty="0"/>
               <a:t>Displays exact data from each of our objects in the class diagram.</a:t>
             </a:r>
           </a:p>
@@ -9227,10 +9171,9 @@
               <a:buChar char="•"/>
             </a:pPr>
             <a:r>
-              <a:rPr lang="en-US" dirty="0" smtClean="0"/>
+              <a:rPr lang="en-US" dirty="0"/>
               <a:t>Used to communicate between tables in a database</a:t>
             </a:r>
-            <a:endParaRPr lang="en-US" dirty="0"/>
           </a:p>
         </p:txBody>
       </p:sp>
@@ -9316,10 +9259,9 @@
           <a:lstStyle/>
           <a:p>
             <a:r>
-              <a:rPr lang="en-US" dirty="0" smtClean="0"/>
+              <a:rPr lang="en-US" dirty="0"/>
               <a:t>Gantt Chart</a:t>
             </a:r>
-            <a:endParaRPr lang="en-US" dirty="0"/>
           </a:p>
         </p:txBody>
       </p:sp>
@@ -9354,7 +9296,7 @@
               <a:buChar char="•"/>
             </a:pPr>
             <a:r>
-              <a:rPr lang="en-US" dirty="0" smtClean="0"/>
+              <a:rPr lang="en-US" dirty="0"/>
               <a:t>Useful for project progression</a:t>
             </a:r>
           </a:p>
@@ -9364,10 +9306,9 @@
               <a:buChar char="•"/>
             </a:pPr>
             <a:r>
-              <a:rPr lang="en-US" dirty="0" smtClean="0"/>
+              <a:rPr lang="en-US" dirty="0"/>
               <a:t>Used Asana as a base application to track tasks for each team member.</a:t>
             </a:r>
-            <a:endParaRPr lang="en-US" dirty="0"/>
           </a:p>
         </p:txBody>
       </p:sp>
@@ -9453,10 +9394,9 @@
           <a:lstStyle/>
           <a:p>
             <a:r>
-              <a:rPr lang="en-US" dirty="0" smtClean="0"/>
+              <a:rPr lang="en-US" dirty="0"/>
               <a:t>Difficulties Encountered</a:t>
             </a:r>
-            <a:endParaRPr lang="en-US" dirty="0"/>
           </a:p>
         </p:txBody>
       </p:sp>
@@ -9516,10 +9456,9 @@
                     <a:p>
                       <a:pPr algn="ctr"/>
                       <a:r>
-                        <a:rPr lang="en-US" dirty="0" smtClean="0"/>
+                        <a:rPr lang="en-US" dirty="0"/>
                         <a:t>Frontend</a:t>
                       </a:r>
-                      <a:endParaRPr lang="en-US" dirty="0"/>
                     </a:p>
                   </a:txBody>
                   <a:tcPr/>
@@ -9531,10 +9470,9 @@
                     <a:p>
                       <a:pPr algn="ctr"/>
                       <a:r>
-                        <a:rPr lang="en-US" dirty="0" smtClean="0"/>
+                        <a:rPr lang="en-US" dirty="0"/>
                         <a:t>API</a:t>
                       </a:r>
-                      <a:endParaRPr lang="en-US" dirty="0"/>
                     </a:p>
                   </a:txBody>
                   <a:tcPr/>
@@ -9546,10 +9484,9 @@
                     <a:p>
                       <a:pPr algn="ctr"/>
                       <a:r>
-                        <a:rPr lang="en-US" dirty="0" smtClean="0"/>
+                        <a:rPr lang="en-US" dirty="0"/>
                         <a:t>Database</a:t>
                       </a:r>
-                      <a:endParaRPr lang="en-US" dirty="0"/>
                     </a:p>
                   </a:txBody>
                   <a:tcPr/>
@@ -9582,7 +9519,7 @@
                         <a:buChar char="•"/>
                       </a:pPr>
                       <a:r>
-                        <a:rPr lang="en-US" dirty="0" smtClean="0"/>
+                        <a:rPr lang="en-US" dirty="0"/>
                         <a:t>Understanding what an API is</a:t>
                       </a:r>
                     </a:p>
@@ -9592,14 +9529,14 @@
                         <a:buChar char="•"/>
                       </a:pPr>
                       <a:r>
-                        <a:rPr lang="en-US" dirty="0" smtClean="0"/>
+                        <a:rPr lang="en-US" dirty="0"/>
                         <a:t>Learning</a:t>
                       </a:r>
                       <a:r>
-                        <a:rPr lang="en-US" baseline="0" dirty="0" smtClean="0"/>
+                        <a:rPr lang="en-US" baseline="0" dirty="0"/>
                         <a:t> PHP and HTML</a:t>
                       </a:r>
-                      <a:endParaRPr lang="en-US" dirty="0" smtClean="0"/>
+                      <a:endParaRPr lang="en-US" dirty="0"/>
                     </a:p>
                     <a:p>
                       <a:pPr algn="l"/>
@@ -9618,11 +9555,11 @@
                         <a:buChar char="•"/>
                       </a:pPr>
                       <a:r>
-                        <a:rPr lang="en-US" dirty="0" smtClean="0"/>
+                        <a:rPr lang="en-US" dirty="0"/>
                         <a:t>Learning</a:t>
                       </a:r>
                       <a:r>
-                        <a:rPr lang="en-US" baseline="0" dirty="0" smtClean="0"/>
+                        <a:rPr lang="en-US" baseline="0" dirty="0"/>
                         <a:t> curve on running a website from a remote database</a:t>
                       </a:r>
                     </a:p>
@@ -9632,7 +9569,7 @@
                         <a:buChar char="•"/>
                       </a:pPr>
                       <a:r>
-                        <a:rPr lang="en-US" baseline="0" dirty="0" smtClean="0"/>
+                        <a:rPr lang="en-US" baseline="0" dirty="0"/>
                         <a:t>Cheap web hosting service. Outdated software tools were used.</a:t>
                       </a:r>
                       <a:endParaRPr lang="en-US" dirty="0"/>
@@ -9732,10 +9669,9 @@
           <a:lstStyle/>
           <a:p>
             <a:r>
-              <a:rPr lang="en-US" dirty="0" smtClean="0"/>
+              <a:rPr lang="en-US" dirty="0"/>
               <a:t>Successes</a:t>
             </a:r>
-            <a:endParaRPr lang="en-US" dirty="0"/>
           </a:p>
         </p:txBody>
       </p:sp>
@@ -9749,7 +9685,7 @@
             <p:ph idx="1"/>
             <p:extLst>
               <p:ext uri="{D42A27DB-BD31-4B8C-83A1-F6EECF244321}">
-                <p14:modId xmlns:p14="http://schemas.microsoft.com/office/powerpoint/2010/main" val="1975365331"/>
+                <p14:modId xmlns:p14="http://schemas.microsoft.com/office/powerpoint/2010/main" val="2335588126"/>
               </p:ext>
             </p:extLst>
           </p:nvPr>
@@ -9794,10 +9730,9 @@
                     <a:lstStyle/>
                     <a:p>
                       <a:r>
-                        <a:rPr lang="en-US" dirty="0" smtClean="0"/>
+                        <a:rPr lang="en-US" dirty="0"/>
                         <a:t>Frontend</a:t>
                       </a:r>
-                      <a:endParaRPr lang="en-US" dirty="0"/>
                     </a:p>
                   </a:txBody>
                   <a:tcPr/>
@@ -9808,10 +9743,9 @@
                     <a:lstStyle/>
                     <a:p>
                       <a:r>
-                        <a:rPr lang="en-US" dirty="0" smtClean="0"/>
+                        <a:rPr lang="en-US" dirty="0"/>
                         <a:t>API</a:t>
                       </a:r>
-                      <a:endParaRPr lang="en-US" dirty="0"/>
                     </a:p>
                   </a:txBody>
                   <a:tcPr/>
@@ -9822,10 +9756,9 @@
                     <a:lstStyle/>
                     <a:p>
                       <a:r>
-                        <a:rPr lang="en-US" dirty="0" smtClean="0"/>
+                        <a:rPr lang="en-US" dirty="0"/>
                         <a:t>Database</a:t>
                       </a:r>
-                      <a:endParaRPr lang="en-US" dirty="0"/>
                     </a:p>
                   </a:txBody>
                   <a:tcPr/>
@@ -9847,14 +9780,34 @@
                         <a:buChar char="•"/>
                       </a:pPr>
                       <a:r>
-                        <a:rPr lang="en-US" dirty="0" smtClean="0"/>
+                        <a:rPr lang="en-US" dirty="0"/>
                         <a:t>Making the webpage interactive with the </a:t>
                       </a:r>
                       <a:r>
-                        <a:rPr lang="en-US" dirty="0" err="1" smtClean="0"/>
+                        <a:rPr lang="en-US" dirty="0" err="1"/>
                         <a:t>javascript</a:t>
                       </a:r>
                       <a:endParaRPr lang="en-US" dirty="0"/>
+                    </a:p>
+                    <a:p>
+                      <a:pPr marL="285750" indent="-285750">
+                        <a:buFont typeface="Arial" panose="020B0604020202020204" pitchFamily="34" charset="0"/>
+                        <a:buChar char="•"/>
+                      </a:pPr>
+                      <a:r>
+                        <a:rPr lang="en-US" dirty="0"/>
+                        <a:t>Implement the hide and show objects function</a:t>
+                      </a:r>
+                    </a:p>
+                    <a:p>
+                      <a:pPr marL="285750" indent="-285750">
+                        <a:buFont typeface="Arial" panose="020B0604020202020204" pitchFamily="34" charset="0"/>
+                        <a:buChar char="•"/>
+                      </a:pPr>
+                      <a:r>
+                        <a:rPr lang="en-US" dirty="0"/>
+                        <a:t>Implement event handlers</a:t>
+                      </a:r>
                     </a:p>
                   </a:txBody>
                   <a:tcPr/>
@@ -9869,19 +9822,19 @@
                         <a:buChar char="•"/>
                       </a:pPr>
                       <a:r>
-                        <a:rPr lang="en-US" dirty="0" smtClean="0"/>
+                        <a:rPr lang="en-US" dirty="0"/>
                         <a:t>Connecting to the database suing </a:t>
                       </a:r>
                       <a:r>
-                        <a:rPr lang="en-US" dirty="0" err="1" smtClean="0"/>
+                        <a:rPr lang="en-US" dirty="0" err="1"/>
                         <a:t>mysqli</a:t>
                       </a:r>
                       <a:r>
-                        <a:rPr lang="en-US" dirty="0" smtClean="0"/>
+                        <a:rPr lang="en-US" dirty="0"/>
                         <a:t>()</a:t>
                       </a:r>
                       <a:r>
-                        <a:rPr lang="en-US" baseline="0" dirty="0" smtClean="0"/>
+                        <a:rPr lang="en-US" baseline="0" dirty="0"/>
                         <a:t> and interacting with the website</a:t>
                       </a:r>
                     </a:p>
@@ -9891,15 +9844,15 @@
                         <a:buChar char="•"/>
                       </a:pPr>
                       <a:r>
-                        <a:rPr lang="en-US" baseline="0" dirty="0" smtClean="0"/>
+                        <a:rPr lang="en-US" baseline="0" dirty="0"/>
                         <a:t>Learned about databases and how to use </a:t>
                       </a:r>
                       <a:r>
-                        <a:rPr lang="en-US" baseline="0" dirty="0" err="1" smtClean="0"/>
+                        <a:rPr lang="en-US" baseline="0" dirty="0" err="1"/>
                         <a:t>json</a:t>
                       </a:r>
                       <a:r>
-                        <a:rPr lang="en-US" baseline="0" dirty="0" smtClean="0"/>
+                        <a:rPr lang="en-US" baseline="0" dirty="0"/>
                         <a:t> conversion to communication with the frontend and backend</a:t>
                       </a:r>
                       <a:endParaRPr lang="en-US" dirty="0"/>
@@ -9917,11 +9870,11 @@
                         <a:buChar char="•"/>
                       </a:pPr>
                       <a:r>
-                        <a:rPr lang="en-US" dirty="0" smtClean="0"/>
+                        <a:rPr lang="en-US" dirty="0"/>
                         <a:t>Designed and implemented a simplistic user database to assist in communication wit</a:t>
                       </a:r>
                       <a:r>
-                        <a:rPr lang="en-US" baseline="0" dirty="0" smtClean="0"/>
+                        <a:rPr lang="en-US" baseline="0" dirty="0"/>
                         <a:t>h the API team</a:t>
                       </a:r>
                     </a:p>
@@ -9931,7 +9884,7 @@
                         <a:buChar char="•"/>
                       </a:pPr>
                       <a:r>
-                        <a:rPr lang="en-US" baseline="0" dirty="0" smtClean="0"/>
+                        <a:rPr lang="en-US" baseline="0" dirty="0"/>
                         <a:t>Knowledge of how the backend is ran on websites</a:t>
                       </a:r>
                       <a:endParaRPr lang="en-US" dirty="0"/>

</xml_diff>